<commit_message>
Ajout schéma bloc DCP/DCN
</commit_message>
<xml_diff>
--- a/Remise/Remise 3/RAE.pptx
+++ b/Remise/Remise 3/RAE.pptx
@@ -5,7 +5,7 @@
     <p:sldMasterId id="2147483660" r:id="rId1"/>
   </p:sldMasterIdLst>
   <p:notesMasterIdLst>
-    <p:notesMasterId r:id="rId13"/>
+    <p:notesMasterId r:id="rId15"/>
   </p:notesMasterIdLst>
   <p:sldIdLst>
     <p:sldId id="257" r:id="rId2"/>
@@ -19,6 +19,8 @@
     <p:sldId id="266" r:id="rId10"/>
     <p:sldId id="267" r:id="rId11"/>
     <p:sldId id="268" r:id="rId12"/>
+    <p:sldId id="270" r:id="rId13"/>
+    <p:sldId id="269" r:id="rId14"/>
   </p:sldIdLst>
   <p:sldSz cx="9144000" cy="6858000" type="screen4x3"/>
   <p:notesSz cx="6858000" cy="9144000"/>
@@ -629,6 +631,90 @@
     <p:extLst>
       <p:ext uri="{BB962C8B-B14F-4D97-AF65-F5344CB8AC3E}">
         <p14:creationId xmlns:p14="http://schemas.microsoft.com/office/powerpoint/2010/main" val="2330796536"/>
+      </p:ext>
+    </p:extLst>
+  </p:cSld>
+  <p:clrMapOvr>
+    <a:masterClrMapping/>
+  </p:clrMapOvr>
+</p:notes>
+</file>
+
+<file path=ppt/notesSlides/notesSlide3.xml><?xml version="1.0" encoding="utf-8"?>
+<p:notes xmlns:a="http://schemas.openxmlformats.org/drawingml/2006/main" xmlns:r="http://schemas.openxmlformats.org/officeDocument/2006/relationships" xmlns:p="http://schemas.openxmlformats.org/presentationml/2006/main">
+  <p:cSld>
+    <p:spTree>
+      <p:nvGrpSpPr>
+        <p:cNvPr id="1" name=""/>
+        <p:cNvGrpSpPr/>
+        <p:nvPr/>
+      </p:nvGrpSpPr>
+      <p:grpSpPr>
+        <a:xfrm>
+          <a:off x="0" y="0"/>
+          <a:ext cx="0" cy="0"/>
+          <a:chOff x="0" y="0"/>
+          <a:chExt cx="0" cy="0"/>
+        </a:xfrm>
+      </p:grpSpPr>
+      <p:sp>
+        <p:nvSpPr>
+          <p:cNvPr id="2" name="Slide Image Placeholder 1"/>
+          <p:cNvSpPr>
+            <a:spLocks noGrp="1" noRot="1" noChangeAspect="1"/>
+          </p:cNvSpPr>
+          <p:nvPr>
+            <p:ph type="sldImg"/>
+          </p:nvPr>
+        </p:nvSpPr>
+        <p:spPr/>
+      </p:sp>
+      <p:sp>
+        <p:nvSpPr>
+          <p:cNvPr id="3" name="Notes Placeholder 2"/>
+          <p:cNvSpPr>
+            <a:spLocks noGrp="1"/>
+          </p:cNvSpPr>
+          <p:nvPr>
+            <p:ph type="body" idx="1"/>
+          </p:nvPr>
+        </p:nvSpPr>
+        <p:spPr/>
+        <p:txBody>
+          <a:bodyPr/>
+          <a:lstStyle/>
+          <a:p>
+            <a:endParaRPr lang="en-US" dirty="0"/>
+          </a:p>
+        </p:txBody>
+      </p:sp>
+      <p:sp>
+        <p:nvSpPr>
+          <p:cNvPr id="4" name="Slide Number Placeholder 3"/>
+          <p:cNvSpPr>
+            <a:spLocks noGrp="1"/>
+          </p:cNvSpPr>
+          <p:nvPr>
+            <p:ph type="sldNum" sz="quarter" idx="10"/>
+          </p:nvPr>
+        </p:nvSpPr>
+        <p:spPr/>
+        <p:txBody>
+          <a:bodyPr/>
+          <a:lstStyle/>
+          <a:p>
+            <a:fld id="{B4F8E8CB-F099-334A-97A8-B886ED765ADC}" type="slidenum">
+              <a:rPr lang="en-US" smtClean="0"/>
+              <a:t>12</a:t>
+            </a:fld>
+            <a:endParaRPr lang="en-US"/>
+          </a:p>
+        </p:txBody>
+      </p:sp>
+    </p:spTree>
+    <p:extLst>
+      <p:ext uri="{BB962C8B-B14F-4D97-AF65-F5344CB8AC3E}">
+        <p14:creationId xmlns:p14="http://schemas.microsoft.com/office/powerpoint/2010/main" val="2666472767"/>
       </p:ext>
     </p:extLst>
   </p:cSld>
@@ -1368,7 +1454,7 @@
                 <a:latin typeface="Trebuchet MS"/>
               </a:rPr>
               <a:pPr/>
-              <a:t>2014-03-28</a:t>
+              <a:t>2014-03-29</a:t>
             </a:fld>
             <a:endParaRPr lang="en-US">
               <a:solidFill>
@@ -1664,7 +1750,7 @@
                 <a:latin typeface="Trebuchet MS"/>
               </a:rPr>
               <a:pPr/>
-              <a:t>2014-03-28</a:t>
+              <a:t>2014-03-29</a:t>
             </a:fld>
             <a:endParaRPr lang="en-US">
               <a:solidFill>
@@ -1948,7 +2034,7 @@
                 <a:latin typeface="Trebuchet MS"/>
               </a:rPr>
               <a:pPr/>
-              <a:t>2014-03-28</a:t>
+              <a:t>2014-03-29</a:t>
             </a:fld>
             <a:endParaRPr lang="en-US">
               <a:solidFill>
@@ -2295,7 +2381,7 @@
                 <a:latin typeface="Trebuchet MS"/>
               </a:rPr>
               <a:pPr/>
-              <a:t>2014-03-28</a:t>
+              <a:t>2014-03-29</a:t>
             </a:fld>
             <a:endParaRPr lang="en-US">
               <a:solidFill>
@@ -2668,7 +2754,7 @@
                 <a:latin typeface="Trebuchet MS"/>
               </a:rPr>
               <a:pPr/>
-              <a:t>2014-03-28</a:t>
+              <a:t>2014-03-29</a:t>
             </a:fld>
             <a:endParaRPr lang="en-US">
               <a:solidFill>
@@ -3015,7 +3101,7 @@
                 <a:latin typeface="Trebuchet MS"/>
               </a:rPr>
               <a:pPr/>
-              <a:t>2014-03-28</a:t>
+              <a:t>2014-03-29</a:t>
             </a:fld>
             <a:endParaRPr lang="en-US">
               <a:solidFill>
@@ -3439,7 +3525,7 @@
                 <a:latin typeface="Trebuchet MS"/>
               </a:rPr>
               <a:pPr/>
-              <a:t>2014-03-28</a:t>
+              <a:t>2014-03-29</a:t>
             </a:fld>
             <a:endParaRPr lang="en-US">
               <a:solidFill>
@@ -3642,7 +3728,7 @@
                 <a:latin typeface="Trebuchet MS"/>
               </a:rPr>
               <a:pPr/>
-              <a:t>2014-03-28</a:t>
+              <a:t>2014-03-29</a:t>
             </a:fld>
             <a:endParaRPr lang="en-US">
               <a:solidFill>
@@ -3855,7 +3941,7 @@
                 <a:latin typeface="Trebuchet MS"/>
               </a:rPr>
               <a:pPr/>
-              <a:t>2014-03-28</a:t>
+              <a:t>2014-03-29</a:t>
             </a:fld>
             <a:endParaRPr lang="en-US">
               <a:solidFill>
@@ -4145,7 +4231,7 @@
                 <a:latin typeface="Trebuchet MS"/>
               </a:rPr>
               <a:pPr/>
-              <a:t>2014-03-28</a:t>
+              <a:t>2014-03-29</a:t>
             </a:fld>
             <a:endParaRPr lang="en-US" dirty="0">
               <a:solidFill>
@@ -4354,7 +4440,7 @@
                 <a:latin typeface="Trebuchet MS"/>
               </a:rPr>
               <a:pPr/>
-              <a:t>2014-03-28</a:t>
+              <a:t>2014-03-29</a:t>
             </a:fld>
             <a:endParaRPr lang="en-US">
               <a:solidFill>
@@ -4634,7 +4720,7 @@
                 <a:latin typeface="Trebuchet MS"/>
               </a:rPr>
               <a:pPr/>
-              <a:t>2014-03-28</a:t>
+              <a:t>2014-03-29</a:t>
             </a:fld>
             <a:endParaRPr lang="en-US">
               <a:solidFill>
@@ -4899,7 +4985,7 @@
                 <a:latin typeface="Trebuchet MS"/>
               </a:rPr>
               <a:pPr/>
-              <a:t>2014-03-28</a:t>
+              <a:t>2014-03-29</a:t>
             </a:fld>
             <a:endParaRPr lang="en-US">
               <a:solidFill>
@@ -5306,7 +5392,7 @@
                 <a:latin typeface="Trebuchet MS"/>
               </a:rPr>
               <a:pPr/>
-              <a:t>2014-03-28</a:t>
+              <a:t>2014-03-29</a:t>
             </a:fld>
             <a:endParaRPr lang="en-US">
               <a:solidFill>
@@ -5462,7 +5548,7 @@
                 <a:latin typeface="Trebuchet MS"/>
               </a:rPr>
               <a:pPr/>
-              <a:t>2014-03-28</a:t>
+              <a:t>2014-03-29</a:t>
             </a:fld>
             <a:endParaRPr lang="en-US">
               <a:solidFill>
@@ -5590,7 +5676,7 @@
                 <a:latin typeface="Trebuchet MS"/>
               </a:rPr>
               <a:pPr/>
-              <a:t>2014-03-28</a:t>
+              <a:t>2014-03-29</a:t>
             </a:fld>
             <a:endParaRPr lang="en-US">
               <a:solidFill>
@@ -5723,7 +5809,7 @@
                 <a:latin typeface="Trebuchet MS"/>
               </a:rPr>
               <a:pPr/>
-              <a:t>2014-03-28</a:t>
+              <a:t>2014-03-29</a:t>
             </a:fld>
             <a:endParaRPr lang="en-US" dirty="0">
               <a:solidFill>
@@ -6551,7 +6637,7 @@
                 <a:latin typeface="Trebuchet MS"/>
               </a:rPr>
               <a:pPr/>
-              <a:t>2014-03-28</a:t>
+              <a:t>2014-03-29</a:t>
             </a:fld>
             <a:endParaRPr lang="en-US">
               <a:solidFill>
@@ -7347,7 +7433,7 @@
                 <a:latin typeface="Trebuchet MS"/>
               </a:rPr>
               <a:pPr defTabSz="914400"/>
-              <a:t>2014-03-28</a:t>
+              <a:t>2014-03-29</a:t>
             </a:fld>
             <a:endParaRPr lang="en-US">
               <a:solidFill>
@@ -7937,11 +8023,7 @@
             </a:r>
             <a:r>
               <a:rPr lang="fr-CA" dirty="0" smtClean="0"/>
-              <a:t>. (</a:t>
-            </a:r>
-            <a:r>
-              <a:rPr lang="fr-CA" dirty="0" smtClean="0"/>
-              <a:t>RAE)</a:t>
+              <a:t>. (RAE)</a:t>
             </a:r>
             <a:r>
               <a:rPr lang="en-US" dirty="0" smtClean="0"/>
@@ -8403,6 +8485,320 @@
     <p:extLst>
       <p:ext uri="{BB962C8B-B14F-4D97-AF65-F5344CB8AC3E}">
         <p14:creationId xmlns:p14="http://schemas.microsoft.com/office/powerpoint/2010/main" val="3740851063"/>
+      </p:ext>
+    </p:extLst>
+  </p:cSld>
+  <p:clrMapOvr>
+    <a:masterClrMapping/>
+  </p:clrMapOvr>
+</p:sld>
+</file>
+
+<file path=ppt/slides/slide12.xml><?xml version="1.0" encoding="utf-8"?>
+<p:sld xmlns:a="http://schemas.openxmlformats.org/drawingml/2006/main" xmlns:r="http://schemas.openxmlformats.org/officeDocument/2006/relationships" xmlns:p="http://schemas.openxmlformats.org/presentationml/2006/main">
+  <p:cSld>
+    <p:spTree>
+      <p:nvGrpSpPr>
+        <p:cNvPr id="1" name=""/>
+        <p:cNvGrpSpPr/>
+        <p:nvPr/>
+      </p:nvGrpSpPr>
+      <p:grpSpPr>
+        <a:xfrm>
+          <a:off x="0" y="0"/>
+          <a:ext cx="0" cy="0"/>
+          <a:chOff x="0" y="0"/>
+          <a:chExt cx="0" cy="0"/>
+        </a:xfrm>
+      </p:grpSpPr>
+      <p:sp>
+        <p:nvSpPr>
+          <p:cNvPr id="2" name="Title 1"/>
+          <p:cNvSpPr>
+            <a:spLocks noGrp="1"/>
+          </p:cNvSpPr>
+          <p:nvPr>
+            <p:ph type="title"/>
+          </p:nvPr>
+        </p:nvSpPr>
+        <p:spPr>
+          <a:xfrm>
+            <a:off x="508001" y="235157"/>
+            <a:ext cx="6447501" cy="1320800"/>
+          </a:xfrm>
+        </p:spPr>
+        <p:txBody>
+          <a:bodyPr/>
+          <a:lstStyle/>
+          <a:p>
+            <a:r>
+              <a:rPr lang="en-US" dirty="0" smtClean="0"/>
+              <a:t>AFE 3 </a:t>
+            </a:r>
+            <a:r>
+              <a:rPr lang="en-US" dirty="0" err="1" smtClean="0"/>
+              <a:t>niveaux</a:t>
+            </a:r>
+            <a:r>
+              <a:rPr lang="en-US" dirty="0" smtClean="0"/>
+              <a:t> NPC avec source </a:t>
+            </a:r>
+            <a:r>
+              <a:rPr lang="en-US" dirty="0" err="1" smtClean="0"/>
+              <a:t>idéale</a:t>
+            </a:r>
+            <a:endParaRPr lang="en-US" dirty="0"/>
+          </a:p>
+        </p:txBody>
+      </p:sp>
+      <p:pic>
+        <p:nvPicPr>
+          <p:cNvPr id="4" name="Picture 3" descr="DCP_DCN.png"/>
+          <p:cNvPicPr>
+            <a:picLocks noChangeAspect="1"/>
+          </p:cNvPicPr>
+          <p:nvPr/>
+        </p:nvPicPr>
+        <p:blipFill>
+          <a:blip r:embed="rId3">
+            <a:extLst>
+              <a:ext uri="{28A0092B-C50C-407E-A947-70E740481C1C}">
+                <a14:useLocalDpi xmlns:a14="http://schemas.microsoft.com/office/drawing/2010/main" val="0"/>
+              </a:ext>
+            </a:extLst>
+          </a:blip>
+          <a:stretch>
+            <a:fillRect/>
+          </a:stretch>
+        </p:blipFill>
+        <p:spPr>
+          <a:xfrm>
+            <a:off x="0" y="1079500"/>
+            <a:ext cx="8612822" cy="4402295"/>
+          </a:xfrm>
+          <a:prstGeom prst="rect">
+            <a:avLst/>
+          </a:prstGeom>
+        </p:spPr>
+      </p:pic>
+      <p:sp>
+        <p:nvSpPr>
+          <p:cNvPr id="5" name="Rectangle 4"/>
+          <p:cNvSpPr/>
+          <p:nvPr/>
+        </p:nvSpPr>
+        <p:spPr>
+          <a:xfrm>
+            <a:off x="276784" y="5352254"/>
+            <a:ext cx="8173224" cy="646331"/>
+          </a:xfrm>
+          <a:prstGeom prst="rect">
+            <a:avLst/>
+          </a:prstGeom>
+        </p:spPr>
+        <p:txBody>
+          <a:bodyPr wrap="square">
+            <a:spAutoFit/>
+          </a:bodyPr>
+          <a:lstStyle/>
+          <a:p>
+            <a:pPr algn="ctr"/>
+            <a:r>
+              <a:rPr lang="en-US" dirty="0" err="1"/>
+              <a:t>Schéma</a:t>
+            </a:r>
+            <a:r>
+              <a:rPr lang="en-US" dirty="0"/>
+              <a:t> bloc </a:t>
+            </a:r>
+            <a:r>
+              <a:rPr lang="en-US" dirty="0" smtClean="0"/>
+              <a:t>du DCP/DCN</a:t>
+            </a:r>
+            <a:r>
+              <a:rPr lang="en-US" baseline="-25000" dirty="0"/>
+              <a:t> </a:t>
+            </a:r>
+            <a:r>
+              <a:rPr lang="en-US" dirty="0" smtClean="0"/>
+              <a:t> 3 </a:t>
+            </a:r>
+            <a:r>
+              <a:rPr lang="en-US" dirty="0" err="1" smtClean="0"/>
+              <a:t>niveaux</a:t>
+            </a:r>
+            <a:r>
+              <a:rPr lang="en-US" dirty="0" smtClean="0"/>
+              <a:t> avec source </a:t>
+            </a:r>
+            <a:r>
+              <a:rPr lang="en-US" dirty="0" err="1" smtClean="0"/>
+              <a:t>idéale</a:t>
+            </a:r>
+            <a:r>
+              <a:rPr lang="en-US" dirty="0" smtClean="0"/>
+              <a:t> avec </a:t>
+            </a:r>
+            <a:r>
+              <a:rPr lang="en-US" dirty="0" err="1" smtClean="0"/>
+              <a:t>une</a:t>
+            </a:r>
+            <a:r>
+              <a:rPr lang="en-US" dirty="0" smtClean="0"/>
+              <a:t> </a:t>
+            </a:r>
+            <a:r>
+              <a:rPr lang="en-US" dirty="0" err="1" smtClean="0"/>
+              <a:t>régulation</a:t>
+            </a:r>
+            <a:r>
+              <a:rPr lang="en-US" dirty="0" smtClean="0"/>
+              <a:t> de courant MLI </a:t>
+            </a:r>
+            <a:r>
+              <a:rPr lang="en-US" dirty="0" err="1" smtClean="0"/>
+              <a:t>à</a:t>
+            </a:r>
+            <a:r>
+              <a:rPr lang="en-US" dirty="0" smtClean="0"/>
+              <a:t> la charge</a:t>
+            </a:r>
+            <a:endParaRPr lang="en-US" dirty="0"/>
+          </a:p>
+        </p:txBody>
+      </p:sp>
+    </p:spTree>
+    <p:extLst>
+      <p:ext uri="{BB962C8B-B14F-4D97-AF65-F5344CB8AC3E}">
+        <p14:creationId xmlns:p14="http://schemas.microsoft.com/office/powerpoint/2010/main" val="3985009438"/>
+      </p:ext>
+    </p:extLst>
+  </p:cSld>
+  <p:clrMapOvr>
+    <a:masterClrMapping/>
+  </p:clrMapOvr>
+</p:sld>
+</file>
+
+<file path=ppt/slides/slide13.xml><?xml version="1.0" encoding="utf-8"?>
+<p:sld xmlns:a="http://schemas.openxmlformats.org/drawingml/2006/main" xmlns:r="http://schemas.openxmlformats.org/officeDocument/2006/relationships" xmlns:p="http://schemas.openxmlformats.org/presentationml/2006/main">
+  <p:cSld>
+    <p:spTree>
+      <p:nvGrpSpPr>
+        <p:cNvPr id="1" name=""/>
+        <p:cNvGrpSpPr/>
+        <p:nvPr/>
+      </p:nvGrpSpPr>
+      <p:grpSpPr>
+        <a:xfrm>
+          <a:off x="0" y="0"/>
+          <a:ext cx="0" cy="0"/>
+          <a:chOff x="0" y="0"/>
+          <a:chExt cx="0" cy="0"/>
+        </a:xfrm>
+      </p:grpSpPr>
+      <p:sp>
+        <p:nvSpPr>
+          <p:cNvPr id="2" name="Title 1"/>
+          <p:cNvSpPr>
+            <a:spLocks noGrp="1"/>
+          </p:cNvSpPr>
+          <p:nvPr>
+            <p:ph type="title"/>
+          </p:nvPr>
+        </p:nvSpPr>
+        <p:spPr>
+          <a:xfrm>
+            <a:off x="508001" y="170037"/>
+            <a:ext cx="6447501" cy="1320800"/>
+          </a:xfrm>
+        </p:spPr>
+        <p:txBody>
+          <a:bodyPr>
+            <a:noAutofit/>
+          </a:bodyPr>
+          <a:lstStyle/>
+          <a:p>
+            <a:r>
+              <a:rPr lang="en-US" sz="2400" dirty="0" smtClean="0"/>
+              <a:t>DC</a:t>
+            </a:r>
+            <a:r>
+              <a:rPr lang="en-US" sz="2400" baseline="-25000" dirty="0" smtClean="0"/>
+              <a:t>P</a:t>
+            </a:r>
+            <a:r>
+              <a:rPr lang="en-US" sz="2400" dirty="0" smtClean="0"/>
+              <a:t>/DC</a:t>
+            </a:r>
+            <a:r>
+              <a:rPr lang="en-US" sz="2400" baseline="-25000" dirty="0" smtClean="0"/>
+              <a:t>N</a:t>
+            </a:r>
+            <a:r>
+              <a:rPr lang="en-US" sz="2400" dirty="0" smtClean="0"/>
+              <a:t>: </a:t>
+            </a:r>
+            <a:r>
+              <a:rPr lang="en-US" sz="2400" dirty="0" err="1" smtClean="0"/>
+              <a:t>Alimenter</a:t>
+            </a:r>
+            <a:r>
+              <a:rPr lang="en-US" sz="2400" dirty="0" smtClean="0"/>
+              <a:t> les </a:t>
+            </a:r>
+            <a:r>
+              <a:rPr lang="en-US" sz="2400" dirty="0" err="1" smtClean="0"/>
+              <a:t>électroaimants</a:t>
+            </a:r>
+            <a:r>
+              <a:rPr lang="en-US" sz="2400" dirty="0" smtClean="0"/>
+              <a:t> de </a:t>
+            </a:r>
+            <a:r>
+              <a:rPr lang="en-US" sz="2400" dirty="0" err="1" smtClean="0"/>
+              <a:t>l’accélérateur</a:t>
+            </a:r>
+            <a:r>
+              <a:rPr lang="en-US" sz="2400" dirty="0" smtClean="0"/>
+              <a:t> de </a:t>
+            </a:r>
+            <a:r>
+              <a:rPr lang="en-US" sz="2400" dirty="0" err="1" smtClean="0"/>
+              <a:t>particules</a:t>
+            </a:r>
+            <a:r>
+              <a:rPr lang="en-US" sz="2400" dirty="0" smtClean="0"/>
+              <a:t> avec </a:t>
+            </a:r>
+            <a:r>
+              <a:rPr lang="en-US" sz="2400" dirty="0" err="1" smtClean="0"/>
+              <a:t>une</a:t>
+            </a:r>
+            <a:r>
+              <a:rPr lang="en-US" sz="2400" dirty="0" smtClean="0"/>
+              <a:t> </a:t>
+            </a:r>
+            <a:r>
+              <a:rPr lang="en-US" sz="2400" dirty="0" err="1" smtClean="0"/>
+              <a:t>forme</a:t>
+            </a:r>
+            <a:r>
+              <a:rPr lang="en-US" sz="2400" dirty="0" smtClean="0"/>
+              <a:t> de courant </a:t>
+            </a:r>
+            <a:r>
+              <a:rPr lang="en-US" sz="2400" dirty="0" err="1" smtClean="0"/>
+              <a:t>précise</a:t>
+            </a:r>
+            <a:endParaRPr lang="en-US" sz="2400" baseline="-25000" dirty="0"/>
+          </a:p>
+        </p:txBody>
+      </p:sp>
+    </p:spTree>
+    <p:extLst>
+      <p:ext uri="{BB962C8B-B14F-4D97-AF65-F5344CB8AC3E}">
+        <p14:creationId xmlns:p14="http://schemas.microsoft.com/office/powerpoint/2010/main" val="4249926908"/>
       </p:ext>
     </p:extLst>
   </p:cSld>
@@ -9652,11 +10048,7 @@
             </a:pPr>
             <a:r>
               <a:rPr lang="fr-CA" sz="1800" dirty="0" smtClean="0"/>
-              <a:t>Permet de réguler le facteur de puissance c</a:t>
-            </a:r>
-            <a:r>
-              <a:rPr lang="fr-CA" sz="1800" dirty="0" smtClean="0"/>
-              <a:t>ôté réseau (régulation d’angle)</a:t>
+              <a:t>Permet de réguler le facteur de puissance côté réseau (régulation d’angle)</a:t>
             </a:r>
           </a:p>
           <a:p>
@@ -10376,11 +10768,6 @@
               </a:rPr>
               <a:t>°</a:t>
             </a:r>
-            <a:endParaRPr lang="en-US" sz="3200" dirty="0">
-              <a:solidFill>
-                <a:prstClr val="black"/>
-              </a:solidFill>
-            </a:endParaRPr>
           </a:p>
         </p:txBody>
       </p:sp>
@@ -10592,11 +10979,6 @@
               </a:rPr>
               <a:t>°</a:t>
             </a:r>
-            <a:endParaRPr lang="en-US" sz="3200" dirty="0">
-              <a:solidFill>
-                <a:prstClr val="black"/>
-              </a:solidFill>
-            </a:endParaRPr>
           </a:p>
         </p:txBody>
       </p:sp>
@@ -11043,7 +11425,7 @@
   <a:extraClrSchemeLst/>
   <a:extLst>
     <a:ext uri="{05A4C25C-085E-4340-85A3-A5531E510DB2}">
-      <thm15:themeFamily xmlns="" xmlns:thm15="http://schemas.microsoft.com/office/thememl/2012/main" name="Facet" id="{C0C680CD-088A-49FC-A102-D699147F32B2}" vid="{CFBC31BA-B70F-4F30-BCAA-4F3011E16C4D}"/>
+      <thm15:themeFamily xmlns:thm15="http://schemas.microsoft.com/office/thememl/2012/main" xmlns="" name="Facet" id="{C0C680CD-088A-49FC-A102-D699147F32B2}" vid="{CFBC31BA-B70F-4F30-BCAA-4F3011E16C4D}"/>
     </a:ext>
   </a:extLst>
 </a:theme>

</xml_diff>